<commit_message>
Related Tools in presentation
</commit_message>
<xml_diff>
--- a/TechWatch/TechWatchSkinTrack.pptx
+++ b/TechWatch/TechWatchSkinTrack.pptx
@@ -4,6 +4,9 @@
   <p:sldMasterIdLst>
     <p:sldMasterId id="2147483857" r:id="rId1"/>
   </p:sldMasterIdLst>
+  <p:notesMasterIdLst>
+    <p:notesMasterId r:id="rId8"/>
+  </p:notesMasterIdLst>
   <p:sldIdLst>
     <p:sldId id="256" r:id="rId2"/>
     <p:sldId id="257" r:id="rId3"/>
@@ -111,7 +114,7 @@
   </p:defaultTextStyle>
   <p:extLst>
     <p:ext uri="{521415D9-36F7-43E2-AB2F-B90AF26B5E84}">
-      <p14:sectionLst xmlns:p14="http://schemas.microsoft.com/office/powerpoint/2010/main">
+      <p14:sectionLst xmlns:p14="http://schemas.microsoft.com/office/powerpoint/2010/main" xmlns="">
         <p14:section name="Standardabschnitt" id="{7ACE8FA0-664B-4A5E-B310-B477F63AEDCD}">
           <p14:sldIdLst>
             <p14:sldId id="256"/>
@@ -125,10 +128,598 @@
       </p14:sectionLst>
     </p:ext>
     <p:ext uri="{EFAFB233-063F-42B5-8137-9DF3F51BA10A}">
-      <p15:sldGuideLst xmlns:p15="http://schemas.microsoft.com/office/powerpoint/2012/main"/>
+      <p15:sldGuideLst xmlns:p15="http://schemas.microsoft.com/office/powerpoint/2012/main" xmlns=""/>
     </p:ext>
   </p:extLst>
 </p:presentation>
+</file>
+
+<file path=ppt/notesMasters/notesMaster1.xml><?xml version="1.0" encoding="utf-8"?>
+<p:notesMaster xmlns:a="http://schemas.openxmlformats.org/drawingml/2006/main" xmlns:r="http://schemas.openxmlformats.org/officeDocument/2006/relationships" xmlns:p="http://schemas.openxmlformats.org/presentationml/2006/main">
+  <p:cSld>
+    <p:bg>
+      <p:bgRef idx="1001">
+        <a:schemeClr val="bg1"/>
+      </p:bgRef>
+    </p:bg>
+    <p:spTree>
+      <p:nvGrpSpPr>
+        <p:cNvPr id="1" name=""/>
+        <p:cNvGrpSpPr/>
+        <p:nvPr/>
+      </p:nvGrpSpPr>
+      <p:grpSpPr>
+        <a:xfrm>
+          <a:off x="0" y="0"/>
+          <a:ext cx="0" cy="0"/>
+          <a:chOff x="0" y="0"/>
+          <a:chExt cx="0" cy="0"/>
+        </a:xfrm>
+      </p:grpSpPr>
+      <p:sp>
+        <p:nvSpPr>
+          <p:cNvPr id="2" name="Kopfzeilenplatzhalter 1"/>
+          <p:cNvSpPr>
+            <a:spLocks noGrp="1"/>
+          </p:cNvSpPr>
+          <p:nvPr>
+            <p:ph type="hdr" sz="quarter"/>
+          </p:nvPr>
+        </p:nvSpPr>
+        <p:spPr>
+          <a:xfrm>
+            <a:off x="0" y="0"/>
+            <a:ext cx="2971800" cy="457200"/>
+          </a:xfrm>
+          <a:prstGeom prst="rect">
+            <a:avLst/>
+          </a:prstGeom>
+        </p:spPr>
+        <p:txBody>
+          <a:bodyPr vert="horz" lIns="91440" tIns="45720" rIns="91440" bIns="45720" rtlCol="0"/>
+          <a:lstStyle>
+            <a:lvl1pPr algn="l">
+              <a:defRPr sz="1200"/>
+            </a:lvl1pPr>
+          </a:lstStyle>
+          <a:p>
+            <a:endParaRPr lang="de-DE"/>
+          </a:p>
+        </p:txBody>
+      </p:sp>
+      <p:sp>
+        <p:nvSpPr>
+          <p:cNvPr id="3" name="Datumsplatzhalter 2"/>
+          <p:cNvSpPr>
+            <a:spLocks noGrp="1"/>
+          </p:cNvSpPr>
+          <p:nvPr>
+            <p:ph type="dt" idx="1"/>
+          </p:nvPr>
+        </p:nvSpPr>
+        <p:spPr>
+          <a:xfrm>
+            <a:off x="3884613" y="0"/>
+            <a:ext cx="2971800" cy="457200"/>
+          </a:xfrm>
+          <a:prstGeom prst="rect">
+            <a:avLst/>
+          </a:prstGeom>
+        </p:spPr>
+        <p:txBody>
+          <a:bodyPr vert="horz" lIns="91440" tIns="45720" rIns="91440" bIns="45720" rtlCol="0"/>
+          <a:lstStyle>
+            <a:lvl1pPr algn="r">
+              <a:defRPr sz="1200"/>
+            </a:lvl1pPr>
+          </a:lstStyle>
+          <a:p>
+            <a:fld id="{0DE677EE-C428-4D05-9987-47C239977870}" type="datetimeFigureOut">
+              <a:rPr lang="de-DE" smtClean="0"/>
+              <a:t>18.06.2016</a:t>
+            </a:fld>
+            <a:endParaRPr lang="de-DE"/>
+          </a:p>
+        </p:txBody>
+      </p:sp>
+      <p:sp>
+        <p:nvSpPr>
+          <p:cNvPr id="4" name="Folienbildplatzhalter 3"/>
+          <p:cNvSpPr>
+            <a:spLocks noGrp="1" noRot="1" noChangeAspect="1"/>
+          </p:cNvSpPr>
+          <p:nvPr>
+            <p:ph type="sldImg" idx="2"/>
+          </p:nvPr>
+        </p:nvSpPr>
+        <p:spPr>
+          <a:xfrm>
+            <a:off x="381000" y="685800"/>
+            <a:ext cx="6096000" cy="3429000"/>
+          </a:xfrm>
+          <a:prstGeom prst="rect">
+            <a:avLst/>
+          </a:prstGeom>
+          <a:noFill/>
+          <a:ln w="12700">
+            <a:solidFill>
+              <a:prstClr val="black"/>
+            </a:solidFill>
+          </a:ln>
+        </p:spPr>
+        <p:txBody>
+          <a:bodyPr vert="horz" lIns="91440" tIns="45720" rIns="91440" bIns="45720" rtlCol="0" anchor="ctr"/>
+          <a:lstStyle/>
+          <a:p>
+            <a:endParaRPr lang="de-DE"/>
+          </a:p>
+        </p:txBody>
+      </p:sp>
+      <p:sp>
+        <p:nvSpPr>
+          <p:cNvPr id="5" name="Notizenplatzhalter 4"/>
+          <p:cNvSpPr>
+            <a:spLocks noGrp="1"/>
+          </p:cNvSpPr>
+          <p:nvPr>
+            <p:ph type="body" sz="quarter" idx="3"/>
+          </p:nvPr>
+        </p:nvSpPr>
+        <p:spPr>
+          <a:xfrm>
+            <a:off x="685800" y="4343400"/>
+            <a:ext cx="5486400" cy="4114800"/>
+          </a:xfrm>
+          <a:prstGeom prst="rect">
+            <a:avLst/>
+          </a:prstGeom>
+        </p:spPr>
+        <p:txBody>
+          <a:bodyPr vert="horz" lIns="91440" tIns="45720" rIns="91440" bIns="45720" rtlCol="0">
+            <a:normAutofit/>
+          </a:bodyPr>
+          <a:lstStyle/>
+          <a:p>
+            <a:pPr lvl="0"/>
+            <a:r>
+              <a:rPr lang="de-DE" smtClean="0"/>
+              <a:t>Textmasterformate durch Klicken bearbeiten</a:t>
+            </a:r>
+          </a:p>
+          <a:p>
+            <a:pPr lvl="1"/>
+            <a:r>
+              <a:rPr lang="de-DE" smtClean="0"/>
+              <a:t>Zweite Ebene</a:t>
+            </a:r>
+          </a:p>
+          <a:p>
+            <a:pPr lvl="2"/>
+            <a:r>
+              <a:rPr lang="de-DE" smtClean="0"/>
+              <a:t>Dritte Ebene</a:t>
+            </a:r>
+          </a:p>
+          <a:p>
+            <a:pPr lvl="3"/>
+            <a:r>
+              <a:rPr lang="de-DE" smtClean="0"/>
+              <a:t>Vierte Ebene</a:t>
+            </a:r>
+          </a:p>
+          <a:p>
+            <a:pPr lvl="4"/>
+            <a:r>
+              <a:rPr lang="de-DE" smtClean="0"/>
+              <a:t>Fünfte Ebene</a:t>
+            </a:r>
+            <a:endParaRPr lang="de-DE"/>
+          </a:p>
+        </p:txBody>
+      </p:sp>
+      <p:sp>
+        <p:nvSpPr>
+          <p:cNvPr id="6" name="Fußzeilenplatzhalter 5"/>
+          <p:cNvSpPr>
+            <a:spLocks noGrp="1"/>
+          </p:cNvSpPr>
+          <p:nvPr>
+            <p:ph type="ftr" sz="quarter" idx="4"/>
+          </p:nvPr>
+        </p:nvSpPr>
+        <p:spPr>
+          <a:xfrm>
+            <a:off x="0" y="8685213"/>
+            <a:ext cx="2971800" cy="457200"/>
+          </a:xfrm>
+          <a:prstGeom prst="rect">
+            <a:avLst/>
+          </a:prstGeom>
+        </p:spPr>
+        <p:txBody>
+          <a:bodyPr vert="horz" lIns="91440" tIns="45720" rIns="91440" bIns="45720" rtlCol="0" anchor="b"/>
+          <a:lstStyle>
+            <a:lvl1pPr algn="l">
+              <a:defRPr sz="1200"/>
+            </a:lvl1pPr>
+          </a:lstStyle>
+          <a:p>
+            <a:endParaRPr lang="de-DE"/>
+          </a:p>
+        </p:txBody>
+      </p:sp>
+      <p:sp>
+        <p:nvSpPr>
+          <p:cNvPr id="7" name="Foliennummernplatzhalter 6"/>
+          <p:cNvSpPr>
+            <a:spLocks noGrp="1"/>
+          </p:cNvSpPr>
+          <p:nvPr>
+            <p:ph type="sldNum" sz="quarter" idx="5"/>
+          </p:nvPr>
+        </p:nvSpPr>
+        <p:spPr>
+          <a:xfrm>
+            <a:off x="3884613" y="8685213"/>
+            <a:ext cx="2971800" cy="457200"/>
+          </a:xfrm>
+          <a:prstGeom prst="rect">
+            <a:avLst/>
+          </a:prstGeom>
+        </p:spPr>
+        <p:txBody>
+          <a:bodyPr vert="horz" lIns="91440" tIns="45720" rIns="91440" bIns="45720" rtlCol="0" anchor="b"/>
+          <a:lstStyle>
+            <a:lvl1pPr algn="r">
+              <a:defRPr sz="1200"/>
+            </a:lvl1pPr>
+          </a:lstStyle>
+          <a:p>
+            <a:fld id="{4DBF3078-DC8F-4371-A3D9-216B1030AAF6}" type="slidenum">
+              <a:rPr lang="de-DE" smtClean="0"/>
+              <a:t>‹Nr.›</a:t>
+            </a:fld>
+            <a:endParaRPr lang="de-DE"/>
+          </a:p>
+        </p:txBody>
+      </p:sp>
+    </p:spTree>
+  </p:cSld>
+  <p:clrMap bg1="lt1" tx1="dk1" bg2="lt2" tx2="dk2" accent1="accent1" accent2="accent2" accent3="accent3" accent4="accent4" accent5="accent5" accent6="accent6" hlink="hlink" folHlink="folHlink"/>
+  <p:notesStyle>
+    <a:lvl1pPr marL="0" algn="l" defTabSz="914400" rtl="0" eaLnBrk="1" latinLnBrk="0" hangingPunct="1">
+      <a:defRPr sz="1200" kern="1200">
+        <a:solidFill>
+          <a:schemeClr val="tx1"/>
+        </a:solidFill>
+        <a:latin typeface="+mn-lt"/>
+        <a:ea typeface="+mn-ea"/>
+        <a:cs typeface="+mn-cs"/>
+      </a:defRPr>
+    </a:lvl1pPr>
+    <a:lvl2pPr marL="457200" algn="l" defTabSz="914400" rtl="0" eaLnBrk="1" latinLnBrk="0" hangingPunct="1">
+      <a:defRPr sz="1200" kern="1200">
+        <a:solidFill>
+          <a:schemeClr val="tx1"/>
+        </a:solidFill>
+        <a:latin typeface="+mn-lt"/>
+        <a:ea typeface="+mn-ea"/>
+        <a:cs typeface="+mn-cs"/>
+      </a:defRPr>
+    </a:lvl2pPr>
+    <a:lvl3pPr marL="914400" algn="l" defTabSz="914400" rtl="0" eaLnBrk="1" latinLnBrk="0" hangingPunct="1">
+      <a:defRPr sz="1200" kern="1200">
+        <a:solidFill>
+          <a:schemeClr val="tx1"/>
+        </a:solidFill>
+        <a:latin typeface="+mn-lt"/>
+        <a:ea typeface="+mn-ea"/>
+        <a:cs typeface="+mn-cs"/>
+      </a:defRPr>
+    </a:lvl3pPr>
+    <a:lvl4pPr marL="1371600" algn="l" defTabSz="914400" rtl="0" eaLnBrk="1" latinLnBrk="0" hangingPunct="1">
+      <a:defRPr sz="1200" kern="1200">
+        <a:solidFill>
+          <a:schemeClr val="tx1"/>
+        </a:solidFill>
+        <a:latin typeface="+mn-lt"/>
+        <a:ea typeface="+mn-ea"/>
+        <a:cs typeface="+mn-cs"/>
+      </a:defRPr>
+    </a:lvl4pPr>
+    <a:lvl5pPr marL="1828800" algn="l" defTabSz="914400" rtl="0" eaLnBrk="1" latinLnBrk="0" hangingPunct="1">
+      <a:defRPr sz="1200" kern="1200">
+        <a:solidFill>
+          <a:schemeClr val="tx1"/>
+        </a:solidFill>
+        <a:latin typeface="+mn-lt"/>
+        <a:ea typeface="+mn-ea"/>
+        <a:cs typeface="+mn-cs"/>
+      </a:defRPr>
+    </a:lvl5pPr>
+    <a:lvl6pPr marL="2286000" algn="l" defTabSz="914400" rtl="0" eaLnBrk="1" latinLnBrk="0" hangingPunct="1">
+      <a:defRPr sz="1200" kern="1200">
+        <a:solidFill>
+          <a:schemeClr val="tx1"/>
+        </a:solidFill>
+        <a:latin typeface="+mn-lt"/>
+        <a:ea typeface="+mn-ea"/>
+        <a:cs typeface="+mn-cs"/>
+      </a:defRPr>
+    </a:lvl6pPr>
+    <a:lvl7pPr marL="2743200" algn="l" defTabSz="914400" rtl="0" eaLnBrk="1" latinLnBrk="0" hangingPunct="1">
+      <a:defRPr sz="1200" kern="1200">
+        <a:solidFill>
+          <a:schemeClr val="tx1"/>
+        </a:solidFill>
+        <a:latin typeface="+mn-lt"/>
+        <a:ea typeface="+mn-ea"/>
+        <a:cs typeface="+mn-cs"/>
+      </a:defRPr>
+    </a:lvl7pPr>
+    <a:lvl8pPr marL="3200400" algn="l" defTabSz="914400" rtl="0" eaLnBrk="1" latinLnBrk="0" hangingPunct="1">
+      <a:defRPr sz="1200" kern="1200">
+        <a:solidFill>
+          <a:schemeClr val="tx1"/>
+        </a:solidFill>
+        <a:latin typeface="+mn-lt"/>
+        <a:ea typeface="+mn-ea"/>
+        <a:cs typeface="+mn-cs"/>
+      </a:defRPr>
+    </a:lvl8pPr>
+    <a:lvl9pPr marL="3657600" algn="l" defTabSz="914400" rtl="0" eaLnBrk="1" latinLnBrk="0" hangingPunct="1">
+      <a:defRPr sz="1200" kern="1200">
+        <a:solidFill>
+          <a:schemeClr val="tx1"/>
+        </a:solidFill>
+        <a:latin typeface="+mn-lt"/>
+        <a:ea typeface="+mn-ea"/>
+        <a:cs typeface="+mn-cs"/>
+      </a:defRPr>
+    </a:lvl9pPr>
+  </p:notesStyle>
+</p:notesMaster>
+</file>
+
+<file path=ppt/notesSlides/notesSlide1.xml><?xml version="1.0" encoding="utf-8"?>
+<p:notes xmlns:a="http://schemas.openxmlformats.org/drawingml/2006/main" xmlns:r="http://schemas.openxmlformats.org/officeDocument/2006/relationships" xmlns:p="http://schemas.openxmlformats.org/presentationml/2006/main">
+  <p:cSld>
+    <p:spTree>
+      <p:nvGrpSpPr>
+        <p:cNvPr id="1" name=""/>
+        <p:cNvGrpSpPr/>
+        <p:nvPr/>
+      </p:nvGrpSpPr>
+      <p:grpSpPr>
+        <a:xfrm>
+          <a:off x="0" y="0"/>
+          <a:ext cx="0" cy="0"/>
+          <a:chOff x="0" y="0"/>
+          <a:chExt cx="0" cy="0"/>
+        </a:xfrm>
+      </p:grpSpPr>
+      <p:sp>
+        <p:nvSpPr>
+          <p:cNvPr id="2" name="Folienbildplatzhalter 1"/>
+          <p:cNvSpPr>
+            <a:spLocks noGrp="1" noRot="1" noChangeAspect="1"/>
+          </p:cNvSpPr>
+          <p:nvPr>
+            <p:ph type="sldImg"/>
+          </p:nvPr>
+        </p:nvSpPr>
+        <p:spPr/>
+      </p:sp>
+      <p:sp>
+        <p:nvSpPr>
+          <p:cNvPr id="3" name="Notizenplatzhalter 2"/>
+          <p:cNvSpPr>
+            <a:spLocks noGrp="1"/>
+          </p:cNvSpPr>
+          <p:nvPr>
+            <p:ph type="body" idx="1"/>
+          </p:nvPr>
+        </p:nvSpPr>
+        <p:spPr/>
+        <p:txBody>
+          <a:bodyPr>
+            <a:normAutofit/>
+          </a:bodyPr>
+          <a:lstStyle/>
+          <a:p>
+            <a:r>
+              <a:rPr lang="en-US" dirty="0" smtClean="0"/>
+              <a:t>- </a:t>
+            </a:r>
+            <a:r>
+              <a:rPr lang="en-US" dirty="0" err="1" smtClean="0"/>
+              <a:t>ISkin</a:t>
+            </a:r>
+            <a:r>
+              <a:rPr lang="en-US" dirty="0" smtClean="0"/>
+              <a:t>: bio-</a:t>
+            </a:r>
+            <a:r>
+              <a:rPr lang="en-US" dirty="0" err="1" smtClean="0"/>
+              <a:t>kompatibler</a:t>
+            </a:r>
+            <a:r>
+              <a:rPr lang="en-US" dirty="0" smtClean="0"/>
+              <a:t>, </a:t>
+            </a:r>
+            <a:r>
+              <a:rPr lang="en-US" dirty="0" err="1" smtClean="0"/>
+              <a:t>dehnbarer</a:t>
+            </a:r>
+            <a:r>
+              <a:rPr lang="en-US" dirty="0" smtClean="0"/>
+              <a:t> "Sticker" </a:t>
+            </a:r>
+            <a:r>
+              <a:rPr lang="en-US" dirty="0" err="1" smtClean="0"/>
+              <a:t>mit</a:t>
+            </a:r>
+            <a:r>
+              <a:rPr lang="en-US" dirty="0" smtClean="0"/>
+              <a:t> Touch-Sensor</a:t>
+            </a:r>
+          </a:p>
+          <a:p>
+            <a:r>
+              <a:rPr lang="en-US" dirty="0" smtClean="0"/>
+              <a:t>- </a:t>
+            </a:r>
+            <a:r>
+              <a:rPr lang="en-US" dirty="0" err="1" smtClean="0"/>
+              <a:t>WatchIt</a:t>
+            </a:r>
+            <a:r>
+              <a:rPr lang="en-US" dirty="0" smtClean="0"/>
+              <a:t>: </a:t>
+            </a:r>
+            <a:r>
+              <a:rPr lang="en-US" dirty="0" err="1" smtClean="0"/>
+              <a:t>benutzt</a:t>
+            </a:r>
+            <a:r>
+              <a:rPr lang="en-US" dirty="0" smtClean="0"/>
+              <a:t> das Armband </a:t>
+            </a:r>
+            <a:r>
+              <a:rPr lang="en-US" dirty="0" err="1" smtClean="0"/>
+              <a:t>der</a:t>
+            </a:r>
+            <a:r>
+              <a:rPr lang="en-US" dirty="0" smtClean="0"/>
+              <a:t> </a:t>
+            </a:r>
+            <a:r>
+              <a:rPr lang="en-US" dirty="0" err="1" smtClean="0"/>
+              <a:t>Wearables</a:t>
+            </a:r>
+            <a:r>
+              <a:rPr lang="en-US" dirty="0" smtClean="0"/>
+              <a:t> </a:t>
+            </a:r>
+            <a:r>
+              <a:rPr lang="en-US" dirty="0" err="1" smtClean="0"/>
+              <a:t>als</a:t>
+            </a:r>
+            <a:r>
+              <a:rPr lang="en-US" dirty="0" smtClean="0"/>
+              <a:t> Touch-Input</a:t>
+            </a:r>
+          </a:p>
+          <a:p>
+            <a:r>
+              <a:rPr lang="en-US" dirty="0" smtClean="0"/>
+              <a:t>- </a:t>
+            </a:r>
+            <a:r>
+              <a:rPr lang="en-US" dirty="0" err="1" smtClean="0"/>
+              <a:t>DiamondTouch</a:t>
+            </a:r>
+            <a:r>
+              <a:rPr lang="en-US" dirty="0" smtClean="0"/>
+              <a:t>: </a:t>
+            </a:r>
+            <a:r>
+              <a:rPr lang="en-US" dirty="0" err="1" smtClean="0"/>
+              <a:t>interaktives</a:t>
+            </a:r>
+            <a:r>
+              <a:rPr lang="en-US" dirty="0" smtClean="0"/>
+              <a:t> Whiteboard, das die </a:t>
+            </a:r>
+            <a:r>
+              <a:rPr lang="en-US" dirty="0" err="1" smtClean="0"/>
+              <a:t>Leitfähigkeit</a:t>
+            </a:r>
+            <a:r>
+              <a:rPr lang="en-US" dirty="0" smtClean="0"/>
+              <a:t> </a:t>
+            </a:r>
+            <a:r>
+              <a:rPr lang="en-US" dirty="0" err="1" smtClean="0"/>
+              <a:t>der</a:t>
+            </a:r>
+            <a:r>
+              <a:rPr lang="en-US" dirty="0" smtClean="0"/>
+              <a:t> Haut </a:t>
+            </a:r>
+            <a:r>
+              <a:rPr lang="en-US" dirty="0" err="1" smtClean="0"/>
+              <a:t>verwendet</a:t>
+            </a:r>
+            <a:r>
+              <a:rPr lang="en-US" dirty="0" smtClean="0"/>
+              <a:t>, um </a:t>
+            </a:r>
+            <a:r>
+              <a:rPr lang="en-US" dirty="0" err="1" smtClean="0"/>
+              <a:t>verschiedene</a:t>
+            </a:r>
+            <a:r>
+              <a:rPr lang="en-US" dirty="0" smtClean="0"/>
+              <a:t> </a:t>
+            </a:r>
+            <a:r>
+              <a:rPr lang="en-US" dirty="0" err="1" smtClean="0"/>
+              <a:t>Nutzer</a:t>
+            </a:r>
+            <a:r>
+              <a:rPr lang="en-US" dirty="0" smtClean="0"/>
+              <a:t> </a:t>
+            </a:r>
+            <a:r>
+              <a:rPr lang="en-US" dirty="0" err="1" smtClean="0"/>
+              <a:t>zu</a:t>
+            </a:r>
+            <a:r>
+              <a:rPr lang="en-US" dirty="0" smtClean="0"/>
+              <a:t> </a:t>
+            </a:r>
+            <a:r>
+              <a:rPr lang="en-US" dirty="0" err="1" smtClean="0"/>
+              <a:t>identifizieren</a:t>
+            </a:r>
+            <a:r>
+              <a:rPr lang="en-US" dirty="0" smtClean="0"/>
+              <a:t> </a:t>
+            </a:r>
+            <a:endParaRPr lang="en-US" dirty="0"/>
+          </a:p>
+        </p:txBody>
+      </p:sp>
+      <p:sp>
+        <p:nvSpPr>
+          <p:cNvPr id="4" name="Foliennummernplatzhalter 3"/>
+          <p:cNvSpPr>
+            <a:spLocks noGrp="1"/>
+          </p:cNvSpPr>
+          <p:nvPr>
+            <p:ph type="sldNum" sz="quarter" idx="10"/>
+          </p:nvPr>
+        </p:nvSpPr>
+        <p:spPr/>
+        <p:txBody>
+          <a:bodyPr/>
+          <a:lstStyle/>
+          <a:p>
+            <a:fld id="{4DBF3078-DC8F-4371-A3D9-216B1030AAF6}" type="slidenum">
+              <a:rPr lang="de-DE" smtClean="0"/>
+              <a:t>5</a:t>
+            </a:fld>
+            <a:endParaRPr lang="de-DE"/>
+          </a:p>
+        </p:txBody>
+      </p:sp>
+    </p:spTree>
+  </p:cSld>
+  <p:clrMapOvr>
+    <a:masterClrMapping/>
+  </p:clrMapOvr>
+</p:notes>
 </file>
 
 <file path=ppt/slideLayouts/slideLayout1.xml><?xml version="1.0" encoding="utf-8"?>
@@ -357,6 +948,7 @@
           <a:p>
             <a:fld id="{217A499B-7E2F-40DB-807B-936D53B28E2C}" type="datetimeFigureOut">
               <a:rPr lang="en-US" smtClean="0"/>
+              <a:pPr/>
               <a:t>6/18/2016</a:t>
             </a:fld>
             <a:endParaRPr lang="en-US"/>
@@ -399,6 +991,7 @@
           <a:p>
             <a:fld id="{E7985506-3076-4AF9-B51B-797DAE11F184}" type="slidenum">
               <a:rPr lang="en-US" smtClean="0"/>
+              <a:pPr/>
               <a:t>‹Nr.›</a:t>
             </a:fld>
             <a:endParaRPr lang="en-US"/>
@@ -446,7 +1039,7 @@
     </p:spTree>
     <p:extLst>
       <p:ext uri="{BB962C8B-B14F-4D97-AF65-F5344CB8AC3E}">
-        <p14:creationId xmlns:p14="http://schemas.microsoft.com/office/powerpoint/2010/main" val="1141710782"/>
+        <p14:creationId xmlns:p14="http://schemas.microsoft.com/office/powerpoint/2010/main" xmlns="" val="1141710782"/>
       </p:ext>
     </p:extLst>
   </p:cSld>
@@ -565,6 +1158,7 @@
           <a:p>
             <a:fld id="{217A499B-7E2F-40DB-807B-936D53B28E2C}" type="datetimeFigureOut">
               <a:rPr lang="en-US" smtClean="0"/>
+              <a:pPr/>
               <a:t>6/18/2016</a:t>
             </a:fld>
             <a:endParaRPr lang="en-US"/>
@@ -607,6 +1201,7 @@
           <a:p>
             <a:fld id="{E7985506-3076-4AF9-B51B-797DAE11F184}" type="slidenum">
               <a:rPr lang="en-US" smtClean="0"/>
+              <a:pPr/>
               <a:t>‹Nr.›</a:t>
             </a:fld>
             <a:endParaRPr lang="en-US"/>
@@ -616,7 +1211,7 @@
     </p:spTree>
     <p:extLst>
       <p:ext uri="{BB962C8B-B14F-4D97-AF65-F5344CB8AC3E}">
-        <p14:creationId xmlns:p14="http://schemas.microsoft.com/office/powerpoint/2010/main" val="1920879955"/>
+        <p14:creationId xmlns:p14="http://schemas.microsoft.com/office/powerpoint/2010/main" xmlns="" val="1920879955"/>
       </p:ext>
     </p:extLst>
   </p:cSld>
@@ -821,6 +1416,7 @@
           <a:p>
             <a:fld id="{217A499B-7E2F-40DB-807B-936D53B28E2C}" type="datetimeFigureOut">
               <a:rPr lang="en-US" smtClean="0"/>
+              <a:pPr/>
               <a:t>6/18/2016</a:t>
             </a:fld>
             <a:endParaRPr lang="en-US"/>
@@ -863,6 +1459,7 @@
           <a:p>
             <a:fld id="{E7985506-3076-4AF9-B51B-797DAE11F184}" type="slidenum">
               <a:rPr lang="en-US" smtClean="0"/>
+              <a:pPr/>
               <a:t>‹Nr.›</a:t>
             </a:fld>
             <a:endParaRPr lang="en-US"/>
@@ -872,7 +1469,7 @@
     </p:spTree>
     <p:extLst>
       <p:ext uri="{BB962C8B-B14F-4D97-AF65-F5344CB8AC3E}">
-        <p14:creationId xmlns:p14="http://schemas.microsoft.com/office/powerpoint/2010/main" val="1222831412"/>
+        <p14:creationId xmlns:p14="http://schemas.microsoft.com/office/powerpoint/2010/main" xmlns="" val="1222831412"/>
       </p:ext>
     </p:extLst>
   </p:cSld>
@@ -991,6 +1588,7 @@
           <a:p>
             <a:fld id="{217A499B-7E2F-40DB-807B-936D53B28E2C}" type="datetimeFigureOut">
               <a:rPr lang="en-US" smtClean="0"/>
+              <a:pPr/>
               <a:t>6/18/2016</a:t>
             </a:fld>
             <a:endParaRPr lang="en-US"/>
@@ -1033,6 +1631,7 @@
           <a:p>
             <a:fld id="{E7985506-3076-4AF9-B51B-797DAE11F184}" type="slidenum">
               <a:rPr lang="en-US" smtClean="0"/>
+              <a:pPr/>
               <a:t>‹Nr.›</a:t>
             </a:fld>
             <a:endParaRPr lang="en-US"/>
@@ -1042,7 +1641,7 @@
     </p:spTree>
     <p:extLst>
       <p:ext uri="{BB962C8B-B14F-4D97-AF65-F5344CB8AC3E}">
-        <p14:creationId xmlns:p14="http://schemas.microsoft.com/office/powerpoint/2010/main" val="1914691446"/>
+        <p14:creationId xmlns:p14="http://schemas.microsoft.com/office/powerpoint/2010/main" xmlns="" val="1914691446"/>
       </p:ext>
     </p:extLst>
   </p:cSld>
@@ -1334,6 +1933,7 @@
           <a:p>
             <a:fld id="{217A499B-7E2F-40DB-807B-936D53B28E2C}" type="datetimeFigureOut">
               <a:rPr lang="en-US" smtClean="0"/>
+              <a:pPr/>
               <a:t>6/18/2016</a:t>
             </a:fld>
             <a:endParaRPr lang="en-US"/>
@@ -1376,6 +1976,7 @@
           <a:p>
             <a:fld id="{E7985506-3076-4AF9-B51B-797DAE11F184}" type="slidenum">
               <a:rPr lang="en-US" smtClean="0"/>
+              <a:pPr/>
               <a:t>‹Nr.›</a:t>
             </a:fld>
             <a:endParaRPr lang="en-US"/>
@@ -1423,7 +2024,7 @@
     </p:spTree>
     <p:extLst>
       <p:ext uri="{BB962C8B-B14F-4D97-AF65-F5344CB8AC3E}">
-        <p14:creationId xmlns:p14="http://schemas.microsoft.com/office/powerpoint/2010/main" val="1316942424"/>
+        <p14:creationId xmlns:p14="http://schemas.microsoft.com/office/powerpoint/2010/main" xmlns="" val="1316942424"/>
       </p:ext>
     </p:extLst>
   </p:cSld>
@@ -1609,6 +2210,7 @@
           <a:p>
             <a:fld id="{217A499B-7E2F-40DB-807B-936D53B28E2C}" type="datetimeFigureOut">
               <a:rPr lang="en-US" smtClean="0"/>
+              <a:pPr/>
               <a:t>6/18/2016</a:t>
             </a:fld>
             <a:endParaRPr lang="en-US"/>
@@ -1651,6 +2253,7 @@
           <a:p>
             <a:fld id="{E7985506-3076-4AF9-B51B-797DAE11F184}" type="slidenum">
               <a:rPr lang="en-US" smtClean="0"/>
+              <a:pPr/>
               <a:t>‹Nr.›</a:t>
             </a:fld>
             <a:endParaRPr lang="en-US"/>
@@ -1660,7 +2263,7 @@
     </p:spTree>
     <p:extLst>
       <p:ext uri="{BB962C8B-B14F-4D97-AF65-F5344CB8AC3E}">
-        <p14:creationId xmlns:p14="http://schemas.microsoft.com/office/powerpoint/2010/main" val="4073113450"/>
+        <p14:creationId xmlns:p14="http://schemas.microsoft.com/office/powerpoint/2010/main" xmlns="" val="4073113450"/>
       </p:ext>
     </p:extLst>
   </p:cSld>
@@ -1988,6 +2591,7 @@
           <a:p>
             <a:fld id="{217A499B-7E2F-40DB-807B-936D53B28E2C}" type="datetimeFigureOut">
               <a:rPr lang="en-US" smtClean="0"/>
+              <a:pPr/>
               <a:t>6/18/2016</a:t>
             </a:fld>
             <a:endParaRPr lang="en-US"/>
@@ -2030,6 +2634,7 @@
           <a:p>
             <a:fld id="{E7985506-3076-4AF9-B51B-797DAE11F184}" type="slidenum">
               <a:rPr lang="en-US" smtClean="0"/>
+              <a:pPr/>
               <a:t>‹Nr.›</a:t>
             </a:fld>
             <a:endParaRPr lang="en-US"/>
@@ -2039,7 +2644,7 @@
     </p:spTree>
     <p:extLst>
       <p:ext uri="{BB962C8B-B14F-4D97-AF65-F5344CB8AC3E}">
-        <p14:creationId xmlns:p14="http://schemas.microsoft.com/office/powerpoint/2010/main" val="950583093"/>
+        <p14:creationId xmlns:p14="http://schemas.microsoft.com/office/powerpoint/2010/main" xmlns="" val="950583093"/>
       </p:ext>
     </p:extLst>
   </p:cSld>
@@ -2106,6 +2711,7 @@
           <a:p>
             <a:fld id="{217A499B-7E2F-40DB-807B-936D53B28E2C}" type="datetimeFigureOut">
               <a:rPr lang="en-US" smtClean="0"/>
+              <a:pPr/>
               <a:t>6/18/2016</a:t>
             </a:fld>
             <a:endParaRPr lang="en-US"/>
@@ -2148,6 +2754,7 @@
           <a:p>
             <a:fld id="{E7985506-3076-4AF9-B51B-797DAE11F184}" type="slidenum">
               <a:rPr lang="en-US" smtClean="0"/>
+              <a:pPr/>
               <a:t>‹Nr.›</a:t>
             </a:fld>
             <a:endParaRPr lang="en-US"/>
@@ -2157,7 +2764,7 @@
     </p:spTree>
     <p:extLst>
       <p:ext uri="{BB962C8B-B14F-4D97-AF65-F5344CB8AC3E}">
-        <p14:creationId xmlns:p14="http://schemas.microsoft.com/office/powerpoint/2010/main" val="1580677065"/>
+        <p14:creationId xmlns:p14="http://schemas.microsoft.com/office/powerpoint/2010/main" xmlns="" val="1580677065"/>
       </p:ext>
     </p:extLst>
   </p:cSld>
@@ -2277,6 +2884,7 @@
           <a:p>
             <a:fld id="{217A499B-7E2F-40DB-807B-936D53B28E2C}" type="datetimeFigureOut">
               <a:rPr lang="en-US" smtClean="0"/>
+              <a:pPr/>
               <a:t>6/18/2016</a:t>
             </a:fld>
             <a:endParaRPr lang="en-US"/>
@@ -2327,6 +2935,7 @@
           <a:p>
             <a:fld id="{E7985506-3076-4AF9-B51B-797DAE11F184}" type="slidenum">
               <a:rPr lang="en-US" smtClean="0"/>
+              <a:pPr/>
               <a:t>‹Nr.›</a:t>
             </a:fld>
             <a:endParaRPr lang="en-US"/>
@@ -2336,7 +2945,7 @@
     </p:spTree>
     <p:extLst>
       <p:ext uri="{BB962C8B-B14F-4D97-AF65-F5344CB8AC3E}">
-        <p14:creationId xmlns:p14="http://schemas.microsoft.com/office/powerpoint/2010/main" val="1473572808"/>
+        <p14:creationId xmlns:p14="http://schemas.microsoft.com/office/powerpoint/2010/main" xmlns="" val="1473572808"/>
       </p:ext>
     </p:extLst>
   </p:cSld>
@@ -2631,6 +3240,7 @@
           <a:p>
             <a:fld id="{217A499B-7E2F-40DB-807B-936D53B28E2C}" type="datetimeFigureOut">
               <a:rPr lang="en-US" smtClean="0"/>
+              <a:pPr/>
               <a:t>6/18/2016</a:t>
             </a:fld>
             <a:endParaRPr lang="en-US"/>
@@ -2694,6 +3304,7 @@
           <a:p>
             <a:fld id="{E7985506-3076-4AF9-B51B-797DAE11F184}" type="slidenum">
               <a:rPr lang="en-US" smtClean="0"/>
+              <a:pPr/>
               <a:t>‹Nr.›</a:t>
             </a:fld>
             <a:endParaRPr lang="en-US"/>
@@ -2703,7 +3314,7 @@
     </p:spTree>
     <p:extLst>
       <p:ext uri="{BB962C8B-B14F-4D97-AF65-F5344CB8AC3E}">
-        <p14:creationId xmlns:p14="http://schemas.microsoft.com/office/powerpoint/2010/main" val="2401518890"/>
+        <p14:creationId xmlns:p14="http://schemas.microsoft.com/office/powerpoint/2010/main" xmlns="" val="2401518890"/>
       </p:ext>
     </p:extLst>
   </p:cSld>
@@ -3008,6 +3619,7 @@
           <a:p>
             <a:fld id="{217A499B-7E2F-40DB-807B-936D53B28E2C}" type="datetimeFigureOut">
               <a:rPr lang="en-US" smtClean="0"/>
+              <a:pPr/>
               <a:t>6/18/2016</a:t>
             </a:fld>
             <a:endParaRPr lang="en-US"/>
@@ -3050,6 +3662,7 @@
           <a:p>
             <a:fld id="{E7985506-3076-4AF9-B51B-797DAE11F184}" type="slidenum">
               <a:rPr lang="en-US" smtClean="0"/>
+              <a:pPr/>
               <a:t>‹Nr.›</a:t>
             </a:fld>
             <a:endParaRPr lang="en-US"/>
@@ -3059,7 +3672,7 @@
     </p:spTree>
     <p:extLst>
       <p:ext uri="{BB962C8B-B14F-4D97-AF65-F5344CB8AC3E}">
-        <p14:creationId xmlns:p14="http://schemas.microsoft.com/office/powerpoint/2010/main" val="1587916971"/>
+        <p14:creationId xmlns:p14="http://schemas.microsoft.com/office/powerpoint/2010/main" xmlns="" val="1587916971"/>
       </p:ext>
     </p:extLst>
   </p:cSld>
@@ -3295,6 +3908,7 @@
           <a:p>
             <a:fld id="{217A499B-7E2F-40DB-807B-936D53B28E2C}" type="datetimeFigureOut">
               <a:rPr lang="en-US" smtClean="0"/>
+              <a:pPr/>
               <a:t>6/18/2016</a:t>
             </a:fld>
             <a:endParaRPr lang="en-US"/>
@@ -3369,6 +3983,7 @@
           <a:p>
             <a:fld id="{E7985506-3076-4AF9-B51B-797DAE11F184}" type="slidenum">
               <a:rPr lang="en-US" smtClean="0"/>
+              <a:pPr/>
               <a:t>‹Nr.›</a:t>
             </a:fld>
             <a:endParaRPr lang="en-US"/>
@@ -3416,7 +4031,7 @@
     </p:spTree>
     <p:extLst>
       <p:ext uri="{BB962C8B-B14F-4D97-AF65-F5344CB8AC3E}">
-        <p14:creationId xmlns:p14="http://schemas.microsoft.com/office/powerpoint/2010/main" val="2573076428"/>
+        <p14:creationId xmlns:p14="http://schemas.microsoft.com/office/powerpoint/2010/main" xmlns="" val="2573076428"/>
       </p:ext>
     </p:extLst>
   </p:cSld>
@@ -3889,7 +4504,7 @@
     </p:spTree>
     <p:extLst>
       <p:ext uri="{BB962C8B-B14F-4D97-AF65-F5344CB8AC3E}">
-        <p14:creationId xmlns:p14="http://schemas.microsoft.com/office/powerpoint/2010/main" val="2022818985"/>
+        <p14:creationId xmlns:p14="http://schemas.microsoft.com/office/powerpoint/2010/main" xmlns="" val="2022818985"/>
       </p:ext>
     </p:extLst>
   </p:cSld>
@@ -3958,7 +4573,7 @@
     </p:spTree>
     <p:extLst>
       <p:ext uri="{BB962C8B-B14F-4D97-AF65-F5344CB8AC3E}">
-        <p14:creationId xmlns:p14="http://schemas.microsoft.com/office/powerpoint/2010/main" val="688282782"/>
+        <p14:creationId xmlns:p14="http://schemas.microsoft.com/office/powerpoint/2010/main" xmlns="" val="688282782"/>
       </p:ext>
     </p:extLst>
   </p:cSld>
@@ -4041,7 +4656,7 @@
     </p:spTree>
     <p:extLst>
       <p:ext uri="{BB962C8B-B14F-4D97-AF65-F5344CB8AC3E}">
-        <p14:creationId xmlns:p14="http://schemas.microsoft.com/office/powerpoint/2010/main" val="1127653880"/>
+        <p14:creationId xmlns:p14="http://schemas.microsoft.com/office/powerpoint/2010/main" xmlns="" val="1127653880"/>
       </p:ext>
     </p:extLst>
   </p:cSld>
@@ -4091,8 +4706,8 @@
           <a:lstStyle/>
           <a:p>
             <a:r>
-              <a:rPr lang="en-US" dirty="0" err="1" smtClean="0"/>
-              <a:t>Advanteges</a:t>
+              <a:rPr lang="en-US" dirty="0" smtClean="0"/>
+              <a:t>Advantages</a:t>
             </a:r>
             <a:endParaRPr lang="en-US" dirty="0"/>
           </a:p>
@@ -4120,7 +4735,7 @@
     </p:spTree>
     <p:extLst>
       <p:ext uri="{BB962C8B-B14F-4D97-AF65-F5344CB8AC3E}">
-        <p14:creationId xmlns:p14="http://schemas.microsoft.com/office/powerpoint/2010/main" val="2084992869"/>
+        <p14:creationId xmlns:p14="http://schemas.microsoft.com/office/powerpoint/2010/main" xmlns="" val="2084992869"/>
       </p:ext>
     </p:extLst>
   </p:cSld>
@@ -4196,10 +4811,178 @@
           </a:p>
         </p:txBody>
       </p:sp>
+      <p:pic>
+        <p:nvPicPr>
+          <p:cNvPr id="2050" name="Picture 2" descr="https://i.ytimg.com/vi/9cvZnhvzrBI/mqdefault.jpg"/>
+          <p:cNvPicPr>
+            <a:picLocks noChangeAspect="1" noChangeArrowheads="1"/>
+          </p:cNvPicPr>
+          <p:nvPr/>
+        </p:nvPicPr>
+        <p:blipFill>
+          <a:blip r:embed="rId3" cstate="print"/>
+          <a:srcRect/>
+          <a:stretch>
+            <a:fillRect/>
+          </a:stretch>
+        </p:blipFill>
+        <p:spPr bwMode="auto">
+          <a:xfrm>
+            <a:off x="1520946" y="2803944"/>
+            <a:ext cx="3788191" cy="2130857"/>
+          </a:xfrm>
+          <a:prstGeom prst="rect">
+            <a:avLst/>
+          </a:prstGeom>
+          <a:noFill/>
+        </p:spPr>
+      </p:pic>
+      <p:pic>
+        <p:nvPicPr>
+          <p:cNvPr id="2052" name="Picture 4" descr="http://perso.telecom-paristech.fr/~via/media/images/watch-it.png"/>
+          <p:cNvPicPr>
+            <a:picLocks noChangeAspect="1" noChangeArrowheads="1"/>
+          </p:cNvPicPr>
+          <p:nvPr/>
+        </p:nvPicPr>
+        <p:blipFill>
+          <a:blip r:embed="rId4" cstate="print"/>
+          <a:srcRect/>
+          <a:stretch>
+            <a:fillRect/>
+          </a:stretch>
+        </p:blipFill>
+        <p:spPr bwMode="auto">
+          <a:xfrm>
+            <a:off x="6014508" y="2432579"/>
+            <a:ext cx="4886519" cy="1563688"/>
+          </a:xfrm>
+          <a:prstGeom prst="rect">
+            <a:avLst/>
+          </a:prstGeom>
+          <a:noFill/>
+        </p:spPr>
+      </p:pic>
+      <p:sp>
+        <p:nvSpPr>
+          <p:cNvPr id="6" name="Textfeld 5"/>
+          <p:cNvSpPr txBox="1"/>
+          <p:nvPr/>
+        </p:nvSpPr>
+        <p:spPr>
+          <a:xfrm>
+            <a:off x="7840133" y="1913466"/>
+            <a:ext cx="1155780" cy="461665"/>
+          </a:xfrm>
+          <a:prstGeom prst="rect">
+            <a:avLst/>
+          </a:prstGeom>
+          <a:noFill/>
+        </p:spPr>
+        <p:txBody>
+          <a:bodyPr wrap="square" rtlCol="0">
+            <a:spAutoFit/>
+          </a:bodyPr>
+          <a:lstStyle/>
+          <a:p>
+            <a:r>
+              <a:rPr lang="de-DE" sz="2400" u="sng" dirty="0" err="1" smtClean="0"/>
+              <a:t>WatchIt</a:t>
+            </a:r>
+            <a:endParaRPr lang="de-DE" sz="2400" u="sng" dirty="0"/>
+          </a:p>
+        </p:txBody>
+      </p:sp>
+      <p:pic>
+        <p:nvPicPr>
+          <p:cNvPr id="2054" name="Picture 6" descr="http://coral.geog.uvic.ca/sites/coral.geog.uvic.ca/files/DT_scematic.jpg"/>
+          <p:cNvPicPr>
+            <a:picLocks noChangeAspect="1" noChangeArrowheads="1"/>
+          </p:cNvPicPr>
+          <p:nvPr/>
+        </p:nvPicPr>
+        <p:blipFill>
+          <a:blip r:embed="rId5" cstate="print"/>
+          <a:srcRect/>
+          <a:stretch>
+            <a:fillRect/>
+          </a:stretch>
+        </p:blipFill>
+        <p:spPr bwMode="auto">
+          <a:xfrm>
+            <a:off x="7586133" y="4222544"/>
+            <a:ext cx="3070225" cy="1958122"/>
+          </a:xfrm>
+          <a:prstGeom prst="rect">
+            <a:avLst/>
+          </a:prstGeom>
+          <a:noFill/>
+        </p:spPr>
+      </p:pic>
+      <p:sp>
+        <p:nvSpPr>
+          <p:cNvPr id="8" name="Textfeld 7"/>
+          <p:cNvSpPr txBox="1"/>
+          <p:nvPr/>
+        </p:nvSpPr>
+        <p:spPr>
+          <a:xfrm>
+            <a:off x="5520267" y="5029200"/>
+            <a:ext cx="2061655" cy="461665"/>
+          </a:xfrm>
+          <a:prstGeom prst="rect">
+            <a:avLst/>
+          </a:prstGeom>
+          <a:noFill/>
+        </p:spPr>
+        <p:txBody>
+          <a:bodyPr wrap="none" rtlCol="0">
+            <a:spAutoFit/>
+          </a:bodyPr>
+          <a:lstStyle/>
+          <a:p>
+            <a:r>
+              <a:rPr lang="de-DE" sz="2400" u="sng" dirty="0" err="1" smtClean="0"/>
+              <a:t>DiamondTouch</a:t>
+            </a:r>
+            <a:endParaRPr lang="de-DE" sz="2400" u="sng" dirty="0"/>
+          </a:p>
+        </p:txBody>
+      </p:sp>
+      <p:sp>
+        <p:nvSpPr>
+          <p:cNvPr id="9" name="Textfeld 8"/>
+          <p:cNvSpPr txBox="1"/>
+          <p:nvPr/>
+        </p:nvSpPr>
+        <p:spPr>
+          <a:xfrm>
+            <a:off x="2929467" y="2252133"/>
+            <a:ext cx="774571" cy="461665"/>
+          </a:xfrm>
+          <a:prstGeom prst="rect">
+            <a:avLst/>
+          </a:prstGeom>
+          <a:noFill/>
+        </p:spPr>
+        <p:txBody>
+          <a:bodyPr wrap="none" rtlCol="0">
+            <a:spAutoFit/>
+          </a:bodyPr>
+          <a:lstStyle/>
+          <a:p>
+            <a:r>
+              <a:rPr lang="de-DE" sz="2400" u="sng" dirty="0" err="1" smtClean="0"/>
+              <a:t>ISkin</a:t>
+            </a:r>
+            <a:endParaRPr lang="de-DE" sz="2400" u="sng" dirty="0"/>
+          </a:p>
+        </p:txBody>
+      </p:sp>
     </p:spTree>
     <p:extLst>
       <p:ext uri="{BB962C8B-B14F-4D97-AF65-F5344CB8AC3E}">
-        <p14:creationId xmlns:p14="http://schemas.microsoft.com/office/powerpoint/2010/main" val="1572990824"/>
+        <p14:creationId xmlns:p14="http://schemas.microsoft.com/office/powerpoint/2010/main" xmlns="" val="1572990824"/>
       </p:ext>
     </p:extLst>
   </p:cSld>
@@ -4309,7 +5092,7 @@
           <p:nvPr>
             <p:extLst>
               <p:ext uri="{D42A27DB-BD31-4B8C-83A1-F6EECF244321}">
-                <p14:modId xmlns:p14="http://schemas.microsoft.com/office/powerpoint/2010/main" val="3279174552"/>
+                <p14:modId xmlns:p14="http://schemas.microsoft.com/office/powerpoint/2010/main" xmlns="" val="3279174552"/>
               </p:ext>
             </p:extLst>
           </p:nvPr>
@@ -4329,14 +5112,14 @@
                 <a:gridCol w="4063995">
                   <a:extLst>
                     <a:ext uri="{9D8B030D-6E8A-4147-A177-3AD203B41FA5}">
-                      <a16:colId xmlns:a16="http://schemas.microsoft.com/office/drawing/2014/main" val="2785450484"/>
+                      <a16:colId xmlns:a16="http://schemas.microsoft.com/office/drawing/2014/main" xmlns="" val="2785450484"/>
                     </a:ext>
                   </a:extLst>
                 </a:gridCol>
                 <a:gridCol w="4063995">
                   <a:extLst>
                     <a:ext uri="{9D8B030D-6E8A-4147-A177-3AD203B41FA5}">
-                      <a16:colId xmlns:a16="http://schemas.microsoft.com/office/drawing/2014/main" val="2752461579"/>
+                      <a16:colId xmlns:a16="http://schemas.microsoft.com/office/drawing/2014/main" xmlns="" val="2752461579"/>
                     </a:ext>
                   </a:extLst>
                 </a:gridCol>
@@ -4378,7 +5161,7 @@
                 </a:tc>
                 <a:extLst>
                   <a:ext uri="{0D108BD9-81ED-4DB2-BD59-A6C34878D82A}">
-                    <a16:rowId xmlns:a16="http://schemas.microsoft.com/office/drawing/2014/main" val="1256562656"/>
+                    <a16:rowId xmlns:a16="http://schemas.microsoft.com/office/drawing/2014/main" xmlns="" val="1256562656"/>
                   </a:ext>
                 </a:extLst>
               </a:tr>
@@ -4438,7 +5221,7 @@
                 </a:tc>
                 <a:extLst>
                   <a:ext uri="{0D108BD9-81ED-4DB2-BD59-A6C34878D82A}">
-                    <a16:rowId xmlns:a16="http://schemas.microsoft.com/office/drawing/2014/main" val="2726032929"/>
+                    <a16:rowId xmlns:a16="http://schemas.microsoft.com/office/drawing/2014/main" xmlns="" val="2726032929"/>
                   </a:ext>
                 </a:extLst>
               </a:tr>
@@ -4478,7 +5261,7 @@
                 </a:tc>
                 <a:extLst>
                   <a:ext uri="{0D108BD9-81ED-4DB2-BD59-A6C34878D82A}">
-                    <a16:rowId xmlns:a16="http://schemas.microsoft.com/office/drawing/2014/main" val="1919643176"/>
+                    <a16:rowId xmlns:a16="http://schemas.microsoft.com/office/drawing/2014/main" xmlns="" val="1919643176"/>
                   </a:ext>
                 </a:extLst>
               </a:tr>
@@ -4489,7 +5272,7 @@
     </p:spTree>
     <p:extLst>
       <p:ext uri="{BB962C8B-B14F-4D97-AF65-F5344CB8AC3E}">
-        <p14:creationId xmlns:p14="http://schemas.microsoft.com/office/powerpoint/2010/main" val="2696770283"/>
+        <p14:creationId xmlns:p14="http://schemas.microsoft.com/office/powerpoint/2010/main" xmlns="" val="2696770283"/>
       </p:ext>
     </p:extLst>
   </p:cSld>
@@ -4549,7 +5332,7 @@
     </a:clrScheme>
     <a:fontScheme name="Rückblick">
       <a:majorFont>
-        <a:latin typeface="Calibri Light" panose="020F0302020204030204"/>
+        <a:latin typeface="Calibri Light"/>
         <a:ea typeface=""/>
         <a:cs typeface=""/>
         <a:font script="Jpan" typeface="ＭＳ Ｐゴシック"/>
@@ -4584,7 +5367,7 @@
         <a:font script="Geor" typeface="Sylfaen"/>
       </a:majorFont>
       <a:minorFont>
-        <a:latin typeface="Calibri" panose="020F0502020204030204"/>
+        <a:latin typeface="Calibri"/>
         <a:ea typeface=""/>
         <a:cs typeface=""/>
         <a:font script="Jpan" typeface="ＭＳ Ｐゴシック"/>
@@ -4783,8 +5566,291 @@
   <a:extraClrSchemeLst/>
   <a:extLst>
     <a:ext uri="{05A4C25C-085E-4340-85A3-A5531E510DB2}">
-      <thm15:themeFamily xmlns:thm15="http://schemas.microsoft.com/office/thememl/2012/main" name="Retrospect" id="{5F128B03-DCCA-4EEB-AB3B-CF2899314A46}" vid="{9CC26709-368C-4D72-9060-94E5B3FF3CD6}"/>
+      <thm15:themeFamily xmlns:thm15="http://schemas.microsoft.com/office/thememl/2012/main" xmlns="" name="Retrospect" id="{5F128B03-DCCA-4EEB-AB3B-CF2899314A46}" vid="{9CC26709-368C-4D72-9060-94E5B3FF3CD6}"/>
     </a:ext>
   </a:extLst>
 </a:theme>
+</file>
+
+<file path=ppt/theme/theme2.xml><?xml version="1.0" encoding="utf-8"?>
+<a:theme xmlns:a="http://schemas.openxmlformats.org/drawingml/2006/main" name="Larissa-Design">
+  <a:themeElements>
+    <a:clrScheme name="Larissa">
+      <a:dk1>
+        <a:sysClr val="windowText" lastClr="000000"/>
+      </a:dk1>
+      <a:lt1>
+        <a:sysClr val="window" lastClr="FFFFFF"/>
+      </a:lt1>
+      <a:dk2>
+        <a:srgbClr val="1F497D"/>
+      </a:dk2>
+      <a:lt2>
+        <a:srgbClr val="EEECE1"/>
+      </a:lt2>
+      <a:accent1>
+        <a:srgbClr val="4F81BD"/>
+      </a:accent1>
+      <a:accent2>
+        <a:srgbClr val="C0504D"/>
+      </a:accent2>
+      <a:accent3>
+        <a:srgbClr val="9BBB59"/>
+      </a:accent3>
+      <a:accent4>
+        <a:srgbClr val="8064A2"/>
+      </a:accent4>
+      <a:accent5>
+        <a:srgbClr val="4BACC6"/>
+      </a:accent5>
+      <a:accent6>
+        <a:srgbClr val="F79646"/>
+      </a:accent6>
+      <a:hlink>
+        <a:srgbClr val="0000FF"/>
+      </a:hlink>
+      <a:folHlink>
+        <a:srgbClr val="800080"/>
+      </a:folHlink>
+    </a:clrScheme>
+    <a:fontScheme name="Larissa">
+      <a:majorFont>
+        <a:latin typeface="Calibri"/>
+        <a:ea typeface=""/>
+        <a:cs typeface=""/>
+        <a:font script="Jpan" typeface="ＭＳ Ｐゴシック"/>
+        <a:font script="Hang" typeface="맑은 고딕"/>
+        <a:font script="Hans" typeface="宋体"/>
+        <a:font script="Hant" typeface="新細明體"/>
+        <a:font script="Arab" typeface="Times New Roman"/>
+        <a:font script="Hebr" typeface="Times New Roman"/>
+        <a:font script="Thai" typeface="Angsana New"/>
+        <a:font script="Ethi" typeface="Nyala"/>
+        <a:font script="Beng" typeface="Vrinda"/>
+        <a:font script="Gujr" typeface="Shruti"/>
+        <a:font script="Khmr" typeface="MoolBoran"/>
+        <a:font script="Knda" typeface="Tunga"/>
+        <a:font script="Guru" typeface="Raavi"/>
+        <a:font script="Cans" typeface="Euphemia"/>
+        <a:font script="Cher" typeface="Plantagenet Cherokee"/>
+        <a:font script="Yiii" typeface="Microsoft Yi Baiti"/>
+        <a:font script="Tibt" typeface="Microsoft Himalaya"/>
+        <a:font script="Thaa" typeface="MV Boli"/>
+        <a:font script="Deva" typeface="Mangal"/>
+        <a:font script="Telu" typeface="Gautami"/>
+        <a:font script="Taml" typeface="Latha"/>
+        <a:font script="Syrc" typeface="Estrangelo Edessa"/>
+        <a:font script="Orya" typeface="Kalinga"/>
+        <a:font script="Mlym" typeface="Kartika"/>
+        <a:font script="Laoo" typeface="DokChampa"/>
+        <a:font script="Sinh" typeface="Iskoola Pota"/>
+        <a:font script="Mong" typeface="Mongolian Baiti"/>
+        <a:font script="Viet" typeface="Times New Roman"/>
+        <a:font script="Uigh" typeface="Microsoft Uighur"/>
+      </a:majorFont>
+      <a:minorFont>
+        <a:latin typeface="Calibri"/>
+        <a:ea typeface=""/>
+        <a:cs typeface=""/>
+        <a:font script="Jpan" typeface="ＭＳ Ｐゴシック"/>
+        <a:font script="Hang" typeface="맑은 고딕"/>
+        <a:font script="Hans" typeface="宋体"/>
+        <a:font script="Hant" typeface="新細明體"/>
+        <a:font script="Arab" typeface="Arial"/>
+        <a:font script="Hebr" typeface="Arial"/>
+        <a:font script="Thai" typeface="Cordia New"/>
+        <a:font script="Ethi" typeface="Nyala"/>
+        <a:font script="Beng" typeface="Vrinda"/>
+        <a:font script="Gujr" typeface="Shruti"/>
+        <a:font script="Khmr" typeface="DaunPenh"/>
+        <a:font script="Knda" typeface="Tunga"/>
+        <a:font script="Guru" typeface="Raavi"/>
+        <a:font script="Cans" typeface="Euphemia"/>
+        <a:font script="Cher" typeface="Plantagenet Cherokee"/>
+        <a:font script="Yiii" typeface="Microsoft Yi Baiti"/>
+        <a:font script="Tibt" typeface="Microsoft Himalaya"/>
+        <a:font script="Thaa" typeface="MV Boli"/>
+        <a:font script="Deva" typeface="Mangal"/>
+        <a:font script="Telu" typeface="Gautami"/>
+        <a:font script="Taml" typeface="Latha"/>
+        <a:font script="Syrc" typeface="Estrangelo Edessa"/>
+        <a:font script="Orya" typeface="Kalinga"/>
+        <a:font script="Mlym" typeface="Kartika"/>
+        <a:font script="Laoo" typeface="DokChampa"/>
+        <a:font script="Sinh" typeface="Iskoola Pota"/>
+        <a:font script="Mong" typeface="Mongolian Baiti"/>
+        <a:font script="Viet" typeface="Arial"/>
+        <a:font script="Uigh" typeface="Microsoft Uighur"/>
+      </a:minorFont>
+    </a:fontScheme>
+    <a:fmtScheme name="Larissa">
+      <a:fillStyleLst>
+        <a:solidFill>
+          <a:schemeClr val="phClr"/>
+        </a:solidFill>
+        <a:gradFill rotWithShape="1">
+          <a:gsLst>
+            <a:gs pos="0">
+              <a:schemeClr val="phClr">
+                <a:tint val="50000"/>
+                <a:satMod val="300000"/>
+              </a:schemeClr>
+            </a:gs>
+            <a:gs pos="35000">
+              <a:schemeClr val="phClr">
+                <a:tint val="37000"/>
+                <a:satMod val="300000"/>
+              </a:schemeClr>
+            </a:gs>
+            <a:gs pos="100000">
+              <a:schemeClr val="phClr">
+                <a:tint val="15000"/>
+                <a:satMod val="350000"/>
+              </a:schemeClr>
+            </a:gs>
+          </a:gsLst>
+          <a:lin ang="16200000" scaled="1"/>
+        </a:gradFill>
+        <a:gradFill rotWithShape="1">
+          <a:gsLst>
+            <a:gs pos="0">
+              <a:schemeClr val="phClr">
+                <a:shade val="51000"/>
+                <a:satMod val="130000"/>
+              </a:schemeClr>
+            </a:gs>
+            <a:gs pos="80000">
+              <a:schemeClr val="phClr">
+                <a:shade val="93000"/>
+                <a:satMod val="130000"/>
+              </a:schemeClr>
+            </a:gs>
+            <a:gs pos="100000">
+              <a:schemeClr val="phClr">
+                <a:shade val="94000"/>
+                <a:satMod val="135000"/>
+              </a:schemeClr>
+            </a:gs>
+          </a:gsLst>
+          <a:lin ang="16200000" scaled="0"/>
+        </a:gradFill>
+      </a:fillStyleLst>
+      <a:lnStyleLst>
+        <a:ln w="9525" cap="flat" cmpd="sng" algn="ctr">
+          <a:solidFill>
+            <a:schemeClr val="phClr">
+              <a:shade val="95000"/>
+              <a:satMod val="105000"/>
+            </a:schemeClr>
+          </a:solidFill>
+          <a:prstDash val="solid"/>
+        </a:ln>
+        <a:ln w="25400" cap="flat" cmpd="sng" algn="ctr">
+          <a:solidFill>
+            <a:schemeClr val="phClr"/>
+          </a:solidFill>
+          <a:prstDash val="solid"/>
+        </a:ln>
+        <a:ln w="38100" cap="flat" cmpd="sng" algn="ctr">
+          <a:solidFill>
+            <a:schemeClr val="phClr"/>
+          </a:solidFill>
+          <a:prstDash val="solid"/>
+        </a:ln>
+      </a:lnStyleLst>
+      <a:effectStyleLst>
+        <a:effectStyle>
+          <a:effectLst>
+            <a:outerShdw blurRad="40000" dist="20000" dir="5400000" rotWithShape="0">
+              <a:srgbClr val="000000">
+                <a:alpha val="38000"/>
+              </a:srgbClr>
+            </a:outerShdw>
+          </a:effectLst>
+        </a:effectStyle>
+        <a:effectStyle>
+          <a:effectLst>
+            <a:outerShdw blurRad="40000" dist="23000" dir="5400000" rotWithShape="0">
+              <a:srgbClr val="000000">
+                <a:alpha val="35000"/>
+              </a:srgbClr>
+            </a:outerShdw>
+          </a:effectLst>
+        </a:effectStyle>
+        <a:effectStyle>
+          <a:effectLst>
+            <a:outerShdw blurRad="40000" dist="23000" dir="5400000" rotWithShape="0">
+              <a:srgbClr val="000000">
+                <a:alpha val="35000"/>
+              </a:srgbClr>
+            </a:outerShdw>
+          </a:effectLst>
+          <a:scene3d>
+            <a:camera prst="orthographicFront">
+              <a:rot lat="0" lon="0" rev="0"/>
+            </a:camera>
+            <a:lightRig rig="threePt" dir="t">
+              <a:rot lat="0" lon="0" rev="1200000"/>
+            </a:lightRig>
+          </a:scene3d>
+          <a:sp3d>
+            <a:bevelT w="63500" h="25400"/>
+          </a:sp3d>
+        </a:effectStyle>
+      </a:effectStyleLst>
+      <a:bgFillStyleLst>
+        <a:solidFill>
+          <a:schemeClr val="phClr"/>
+        </a:solidFill>
+        <a:gradFill rotWithShape="1">
+          <a:gsLst>
+            <a:gs pos="0">
+              <a:schemeClr val="phClr">
+                <a:tint val="40000"/>
+                <a:satMod val="350000"/>
+              </a:schemeClr>
+            </a:gs>
+            <a:gs pos="40000">
+              <a:schemeClr val="phClr">
+                <a:tint val="45000"/>
+                <a:shade val="99000"/>
+                <a:satMod val="350000"/>
+              </a:schemeClr>
+            </a:gs>
+            <a:gs pos="100000">
+              <a:schemeClr val="phClr">
+                <a:shade val="20000"/>
+                <a:satMod val="255000"/>
+              </a:schemeClr>
+            </a:gs>
+          </a:gsLst>
+          <a:path path="circle">
+            <a:fillToRect l="50000" t="-80000" r="50000" b="180000"/>
+          </a:path>
+        </a:gradFill>
+        <a:gradFill rotWithShape="1">
+          <a:gsLst>
+            <a:gs pos="0">
+              <a:schemeClr val="phClr">
+                <a:tint val="80000"/>
+                <a:satMod val="300000"/>
+              </a:schemeClr>
+            </a:gs>
+            <a:gs pos="100000">
+              <a:schemeClr val="phClr">
+                <a:shade val="30000"/>
+                <a:satMod val="200000"/>
+              </a:schemeClr>
+            </a:gs>
+          </a:gsLst>
+          <a:path path="circle">
+            <a:fillToRect l="50000" t="50000" r="50000" b="50000"/>
+          </a:path>
+        </a:gradFill>
+      </a:bgFillStyleLst>
+    </a:fmtScheme>
+  </a:themeElements>
+  <a:objectDefaults/>
+  <a:extraClrSchemeLst/>
+</a:theme>
 </file>
</xml_diff>